<commit_message>
Updated fixme in _THESIS.tex. Added draft watermark. Corrected array writing and pixel layout diagrams.
</commit_message>
<xml_diff>
--- a/fig/superpixel_layout.pptx
+++ b/fig/superpixel_layout.pptx
@@ -104,6 +104,11 @@
       </a:defRPr>
     </a:lvl9pPr>
   </p:defaultTextStyle>
+  <p:extLst>
+    <p:ext uri="{EFAFB233-063F-42B5-8137-9DF3F51BA10A}">
+      <p15:sldGuideLst xmlns:p15="http://schemas.microsoft.com/office/powerpoint/2012/main"/>
+    </p:ext>
+  </p:extLst>
 </p:presentation>
 </file>
 
@@ -254,7 +259,7 @@
           <a:p>
             <a:fld id="{3DB6A138-7174-4D36-959E-4AD6A5826218}" type="datetimeFigureOut">
               <a:rPr lang="en-US" smtClean="0"/>
-              <a:t>4/1/2020</a:t>
+              <a:t>6/23/2020</a:t>
             </a:fld>
             <a:endParaRPr lang="en-US"/>
           </a:p>
@@ -452,7 +457,7 @@
           <a:p>
             <a:fld id="{3DB6A138-7174-4D36-959E-4AD6A5826218}" type="datetimeFigureOut">
               <a:rPr lang="en-US" smtClean="0"/>
-              <a:t>4/1/2020</a:t>
+              <a:t>6/23/2020</a:t>
             </a:fld>
             <a:endParaRPr lang="en-US"/>
           </a:p>
@@ -660,7 +665,7 @@
           <a:p>
             <a:fld id="{3DB6A138-7174-4D36-959E-4AD6A5826218}" type="datetimeFigureOut">
               <a:rPr lang="en-US" smtClean="0"/>
-              <a:t>4/1/2020</a:t>
+              <a:t>6/23/2020</a:t>
             </a:fld>
             <a:endParaRPr lang="en-US"/>
           </a:p>
@@ -858,7 +863,7 @@
           <a:p>
             <a:fld id="{3DB6A138-7174-4D36-959E-4AD6A5826218}" type="datetimeFigureOut">
               <a:rPr lang="en-US" smtClean="0"/>
-              <a:t>4/1/2020</a:t>
+              <a:t>6/23/2020</a:t>
             </a:fld>
             <a:endParaRPr lang="en-US"/>
           </a:p>
@@ -1133,7 +1138,7 @@
           <a:p>
             <a:fld id="{3DB6A138-7174-4D36-959E-4AD6A5826218}" type="datetimeFigureOut">
               <a:rPr lang="en-US" smtClean="0"/>
-              <a:t>4/1/2020</a:t>
+              <a:t>6/23/2020</a:t>
             </a:fld>
             <a:endParaRPr lang="en-US"/>
           </a:p>
@@ -1398,7 +1403,7 @@
           <a:p>
             <a:fld id="{3DB6A138-7174-4D36-959E-4AD6A5826218}" type="datetimeFigureOut">
               <a:rPr lang="en-US" smtClean="0"/>
-              <a:t>4/1/2020</a:t>
+              <a:t>6/23/2020</a:t>
             </a:fld>
             <a:endParaRPr lang="en-US"/>
           </a:p>
@@ -1810,7 +1815,7 @@
           <a:p>
             <a:fld id="{3DB6A138-7174-4D36-959E-4AD6A5826218}" type="datetimeFigureOut">
               <a:rPr lang="en-US" smtClean="0"/>
-              <a:t>4/1/2020</a:t>
+              <a:t>6/23/2020</a:t>
             </a:fld>
             <a:endParaRPr lang="en-US"/>
           </a:p>
@@ -1951,7 +1956,7 @@
           <a:p>
             <a:fld id="{3DB6A138-7174-4D36-959E-4AD6A5826218}" type="datetimeFigureOut">
               <a:rPr lang="en-US" smtClean="0"/>
-              <a:t>4/1/2020</a:t>
+              <a:t>6/23/2020</a:t>
             </a:fld>
             <a:endParaRPr lang="en-US"/>
           </a:p>
@@ -2064,7 +2069,7 @@
           <a:p>
             <a:fld id="{3DB6A138-7174-4D36-959E-4AD6A5826218}" type="datetimeFigureOut">
               <a:rPr lang="en-US" smtClean="0"/>
-              <a:t>4/1/2020</a:t>
+              <a:t>6/23/2020</a:t>
             </a:fld>
             <a:endParaRPr lang="en-US"/>
           </a:p>
@@ -2375,7 +2380,7 @@
           <a:p>
             <a:fld id="{3DB6A138-7174-4D36-959E-4AD6A5826218}" type="datetimeFigureOut">
               <a:rPr lang="en-US" smtClean="0"/>
-              <a:t>4/1/2020</a:t>
+              <a:t>6/23/2020</a:t>
             </a:fld>
             <a:endParaRPr lang="en-US"/>
           </a:p>
@@ -2663,7 +2668,7 @@
           <a:p>
             <a:fld id="{3DB6A138-7174-4D36-959E-4AD6A5826218}" type="datetimeFigureOut">
               <a:rPr lang="en-US" smtClean="0"/>
-              <a:t>4/1/2020</a:t>
+              <a:t>6/23/2020</a:t>
             </a:fld>
             <a:endParaRPr lang="en-US"/>
           </a:p>
@@ -2904,7 +2909,7 @@
           <a:p>
             <a:fld id="{3DB6A138-7174-4D36-959E-4AD6A5826218}" type="datetimeFigureOut">
               <a:rPr lang="en-US" smtClean="0"/>
-              <a:t>4/1/2020</a:t>
+              <a:t>6/23/2020</a:t>
             </a:fld>
             <a:endParaRPr lang="en-US"/>
           </a:p>
@@ -3624,12 +3629,12 @@
           <a:p>
             <a:pPr algn="ctr"/>
             <a:r>
-              <a:rPr lang="en-US" sz="9600" dirty="0">
+              <a:rPr lang="en-US" sz="4800" dirty="0">
                 <a:solidFill>
                   <a:schemeClr val="tx1"/>
                 </a:solidFill>
               </a:rPr>
-              <a:t>p</a:t>
+              <a:t>p|ch1</a:t>
             </a:r>
           </a:p>
         </p:txBody>
@@ -3685,12 +3690,12 @@
           <a:p>
             <a:pPr algn="ctr"/>
             <a:r>
-              <a:rPr lang="en-US" sz="9600" dirty="0">
+              <a:rPr lang="en-US" sz="4800" dirty="0">
                 <a:solidFill>
                   <a:schemeClr val="tx1"/>
                 </a:solidFill>
               </a:rPr>
-              <a:t>p</a:t>
+              <a:t>p|ch1</a:t>
             </a:r>
           </a:p>
         </p:txBody>
@@ -3746,12 +3751,12 @@
           <a:p>
             <a:pPr algn="ctr"/>
             <a:r>
-              <a:rPr lang="en-US" sz="9600" dirty="0">
+              <a:rPr lang="en-US" sz="4800" dirty="0">
                 <a:solidFill>
                   <a:schemeClr val="tx1"/>
                 </a:solidFill>
               </a:rPr>
-              <a:t>n</a:t>
+              <a:t>n|ch0</a:t>
             </a:r>
           </a:p>
         </p:txBody>
@@ -3807,12 +3812,12 @@
           <a:p>
             <a:pPr algn="ctr"/>
             <a:r>
-              <a:rPr lang="en-US" sz="9600" dirty="0">
+              <a:rPr lang="en-US" sz="4800" dirty="0">
                 <a:solidFill>
                   <a:schemeClr val="tx1"/>
                 </a:solidFill>
               </a:rPr>
-              <a:t>n</a:t>
+              <a:t>n|ch0</a:t>
             </a:r>
           </a:p>
         </p:txBody>

</xml_diff>

<commit_message>
black on blue unreadable. Switched color to white for some diagrams
</commit_message>
<xml_diff>
--- a/fig/superpixel_layout.pptx
+++ b/fig/superpixel_layout.pptx
@@ -259,7 +259,7 @@
           <a:p>
             <a:fld id="{3DB6A138-7174-4D36-959E-4AD6A5826218}" type="datetimeFigureOut">
               <a:rPr lang="en-US" smtClean="0"/>
-              <a:t>6/23/2020</a:t>
+              <a:t>10/29/2020</a:t>
             </a:fld>
             <a:endParaRPr lang="en-US"/>
           </a:p>
@@ -457,7 +457,7 @@
           <a:p>
             <a:fld id="{3DB6A138-7174-4D36-959E-4AD6A5826218}" type="datetimeFigureOut">
               <a:rPr lang="en-US" smtClean="0"/>
-              <a:t>6/23/2020</a:t>
+              <a:t>10/29/2020</a:t>
             </a:fld>
             <a:endParaRPr lang="en-US"/>
           </a:p>
@@ -665,7 +665,7 @@
           <a:p>
             <a:fld id="{3DB6A138-7174-4D36-959E-4AD6A5826218}" type="datetimeFigureOut">
               <a:rPr lang="en-US" smtClean="0"/>
-              <a:t>6/23/2020</a:t>
+              <a:t>10/29/2020</a:t>
             </a:fld>
             <a:endParaRPr lang="en-US"/>
           </a:p>
@@ -863,7 +863,7 @@
           <a:p>
             <a:fld id="{3DB6A138-7174-4D36-959E-4AD6A5826218}" type="datetimeFigureOut">
               <a:rPr lang="en-US" smtClean="0"/>
-              <a:t>6/23/2020</a:t>
+              <a:t>10/29/2020</a:t>
             </a:fld>
             <a:endParaRPr lang="en-US"/>
           </a:p>
@@ -1138,7 +1138,7 @@
           <a:p>
             <a:fld id="{3DB6A138-7174-4D36-959E-4AD6A5826218}" type="datetimeFigureOut">
               <a:rPr lang="en-US" smtClean="0"/>
-              <a:t>6/23/2020</a:t>
+              <a:t>10/29/2020</a:t>
             </a:fld>
             <a:endParaRPr lang="en-US"/>
           </a:p>
@@ -1403,7 +1403,7 @@
           <a:p>
             <a:fld id="{3DB6A138-7174-4D36-959E-4AD6A5826218}" type="datetimeFigureOut">
               <a:rPr lang="en-US" smtClean="0"/>
-              <a:t>6/23/2020</a:t>
+              <a:t>10/29/2020</a:t>
             </a:fld>
             <a:endParaRPr lang="en-US"/>
           </a:p>
@@ -1815,7 +1815,7 @@
           <a:p>
             <a:fld id="{3DB6A138-7174-4D36-959E-4AD6A5826218}" type="datetimeFigureOut">
               <a:rPr lang="en-US" smtClean="0"/>
-              <a:t>6/23/2020</a:t>
+              <a:t>10/29/2020</a:t>
             </a:fld>
             <a:endParaRPr lang="en-US"/>
           </a:p>
@@ -1956,7 +1956,7 @@
           <a:p>
             <a:fld id="{3DB6A138-7174-4D36-959E-4AD6A5826218}" type="datetimeFigureOut">
               <a:rPr lang="en-US" smtClean="0"/>
-              <a:t>6/23/2020</a:t>
+              <a:t>10/29/2020</a:t>
             </a:fld>
             <a:endParaRPr lang="en-US"/>
           </a:p>
@@ -2069,7 +2069,7 @@
           <a:p>
             <a:fld id="{3DB6A138-7174-4D36-959E-4AD6A5826218}" type="datetimeFigureOut">
               <a:rPr lang="en-US" smtClean="0"/>
-              <a:t>6/23/2020</a:t>
+              <a:t>10/29/2020</a:t>
             </a:fld>
             <a:endParaRPr lang="en-US"/>
           </a:p>
@@ -2380,7 +2380,7 @@
           <a:p>
             <a:fld id="{3DB6A138-7174-4D36-959E-4AD6A5826218}" type="datetimeFigureOut">
               <a:rPr lang="en-US" smtClean="0"/>
-              <a:t>6/23/2020</a:t>
+              <a:t>10/29/2020</a:t>
             </a:fld>
             <a:endParaRPr lang="en-US"/>
           </a:p>
@@ -2668,7 +2668,7 @@
           <a:p>
             <a:fld id="{3DB6A138-7174-4D36-959E-4AD6A5826218}" type="datetimeFigureOut">
               <a:rPr lang="en-US" smtClean="0"/>
-              <a:t>6/23/2020</a:t>
+              <a:t>10/29/2020</a:t>
             </a:fld>
             <a:endParaRPr lang="en-US"/>
           </a:p>
@@ -2909,7 +2909,7 @@
           <a:p>
             <a:fld id="{3DB6A138-7174-4D36-959E-4AD6A5826218}" type="datetimeFigureOut">
               <a:rPr lang="en-US" smtClean="0"/>
-              <a:t>6/23/2020</a:t>
+              <a:t>10/29/2020</a:t>
             </a:fld>
             <a:endParaRPr lang="en-US"/>
           </a:p>
@@ -3814,7 +3814,7 @@
             <a:r>
               <a:rPr lang="en-US" sz="4800" dirty="0">
                 <a:solidFill>
-                  <a:schemeClr val="tx1"/>
+                  <a:schemeClr val="bg1"/>
                 </a:solidFill>
               </a:rPr>
               <a:t>n|ch0</a:t>

</xml_diff>